<commit_message>
Final Notebook for Review
</commit_message>
<xml_diff>
--- a/Predicting Recidivism in Released Prisoner in Iowa.pptx
+++ b/Predicting Recidivism in Released Prisoner in Iowa.pptx
@@ -6,8 +6,12 @@
   </p:sldMasterIdLst>
   <p:sldIdLst>
     <p:sldId id="256" r:id="rId2"/>
-    <p:sldId id="257" r:id="rId3"/>
-    <p:sldId id="258" r:id="rId4"/>
+    <p:sldId id="261" r:id="rId3"/>
+    <p:sldId id="257" r:id="rId4"/>
+    <p:sldId id="258" r:id="rId5"/>
+    <p:sldId id="259" r:id="rId6"/>
+    <p:sldId id="260" r:id="rId7"/>
+    <p:sldId id="262" r:id="rId8"/>
   </p:sldIdLst>
   <p:sldSz cx="12192000" cy="6858000"/>
   <p:notesSz cx="6858000" cy="9144000"/>
@@ -261,7 +265,7 @@
           <a:p>
             <a:fld id="{9F368D5F-B914-41C5-B897-CC7F5F914261}" type="datetimeFigureOut">
               <a:rPr lang="en-US" smtClean="0"/>
-              <a:t>5/14/2019</a:t>
+              <a:t>5/15/2019</a:t>
             </a:fld>
             <a:endParaRPr lang="en-US"/>
           </a:p>
@@ -459,7 +463,7 @@
           <a:p>
             <a:fld id="{9F368D5F-B914-41C5-B897-CC7F5F914261}" type="datetimeFigureOut">
               <a:rPr lang="en-US" smtClean="0"/>
-              <a:t>5/14/2019</a:t>
+              <a:t>5/15/2019</a:t>
             </a:fld>
             <a:endParaRPr lang="en-US"/>
           </a:p>
@@ -667,7 +671,7 @@
           <a:p>
             <a:fld id="{9F368D5F-B914-41C5-B897-CC7F5F914261}" type="datetimeFigureOut">
               <a:rPr lang="en-US" smtClean="0"/>
-              <a:t>5/14/2019</a:t>
+              <a:t>5/15/2019</a:t>
             </a:fld>
             <a:endParaRPr lang="en-US"/>
           </a:p>
@@ -865,7 +869,7 @@
           <a:p>
             <a:fld id="{9F368D5F-B914-41C5-B897-CC7F5F914261}" type="datetimeFigureOut">
               <a:rPr lang="en-US" smtClean="0"/>
-              <a:t>5/14/2019</a:t>
+              <a:t>5/15/2019</a:t>
             </a:fld>
             <a:endParaRPr lang="en-US"/>
           </a:p>
@@ -1140,7 +1144,7 @@
           <a:p>
             <a:fld id="{9F368D5F-B914-41C5-B897-CC7F5F914261}" type="datetimeFigureOut">
               <a:rPr lang="en-US" smtClean="0"/>
-              <a:t>5/14/2019</a:t>
+              <a:t>5/15/2019</a:t>
             </a:fld>
             <a:endParaRPr lang="en-US"/>
           </a:p>
@@ -1405,7 +1409,7 @@
           <a:p>
             <a:fld id="{9F368D5F-B914-41C5-B897-CC7F5F914261}" type="datetimeFigureOut">
               <a:rPr lang="en-US" smtClean="0"/>
-              <a:t>5/14/2019</a:t>
+              <a:t>5/15/2019</a:t>
             </a:fld>
             <a:endParaRPr lang="en-US"/>
           </a:p>
@@ -1817,7 +1821,7 @@
           <a:p>
             <a:fld id="{9F368D5F-B914-41C5-B897-CC7F5F914261}" type="datetimeFigureOut">
               <a:rPr lang="en-US" smtClean="0"/>
-              <a:t>5/14/2019</a:t>
+              <a:t>5/15/2019</a:t>
             </a:fld>
             <a:endParaRPr lang="en-US"/>
           </a:p>
@@ -1958,7 +1962,7 @@
           <a:p>
             <a:fld id="{9F368D5F-B914-41C5-B897-CC7F5F914261}" type="datetimeFigureOut">
               <a:rPr lang="en-US" smtClean="0"/>
-              <a:t>5/14/2019</a:t>
+              <a:t>5/15/2019</a:t>
             </a:fld>
             <a:endParaRPr lang="en-US"/>
           </a:p>
@@ -2071,7 +2075,7 @@
           <a:p>
             <a:fld id="{9F368D5F-B914-41C5-B897-CC7F5F914261}" type="datetimeFigureOut">
               <a:rPr lang="en-US" smtClean="0"/>
-              <a:t>5/14/2019</a:t>
+              <a:t>5/15/2019</a:t>
             </a:fld>
             <a:endParaRPr lang="en-US"/>
           </a:p>
@@ -2382,7 +2386,7 @@
           <a:p>
             <a:fld id="{9F368D5F-B914-41C5-B897-CC7F5F914261}" type="datetimeFigureOut">
               <a:rPr lang="en-US" smtClean="0"/>
-              <a:t>5/14/2019</a:t>
+              <a:t>5/15/2019</a:t>
             </a:fld>
             <a:endParaRPr lang="en-US"/>
           </a:p>
@@ -2670,7 +2674,7 @@
           <a:p>
             <a:fld id="{9F368D5F-B914-41C5-B897-CC7F5F914261}" type="datetimeFigureOut">
               <a:rPr lang="en-US" smtClean="0"/>
-              <a:t>5/14/2019</a:t>
+              <a:t>5/15/2019</a:t>
             </a:fld>
             <a:endParaRPr lang="en-US"/>
           </a:p>
@@ -2911,7 +2915,7 @@
           <a:p>
             <a:fld id="{9F368D5F-B914-41C5-B897-CC7F5F914261}" type="datetimeFigureOut">
               <a:rPr lang="en-US" smtClean="0"/>
-              <a:t>5/14/2019</a:t>
+              <a:t>5/15/2019</a:t>
             </a:fld>
             <a:endParaRPr lang="en-US"/>
           </a:p>
@@ -3477,7 +3481,7 @@
           <a:p>
             <a:pPr algn="l"/>
             <a:r>
-              <a:rPr lang="en-US" sz="2000">
+              <a:rPr lang="en-US" dirty="0">
                 <a:solidFill>
                   <a:srgbClr val="FFFFFF"/>
                 </a:solidFill>
@@ -3501,6 +3505,319 @@
 </file>
 
 <file path=ppt/slides/slide2.xml><?xml version="1.0" encoding="utf-8"?>
+<p:sld xmlns:a="http://schemas.openxmlformats.org/drawingml/2006/main" xmlns:r="http://schemas.openxmlformats.org/officeDocument/2006/relationships" xmlns:p="http://schemas.openxmlformats.org/presentationml/2006/main">
+  <p:cSld>
+    <p:bg>
+      <p:bgPr>
+        <a:solidFill>
+          <a:schemeClr val="tx1"/>
+        </a:solidFill>
+        <a:effectLst/>
+      </p:bgPr>
+    </p:bg>
+    <p:spTree>
+      <p:nvGrpSpPr>
+        <p:cNvPr id="1" name=""/>
+        <p:cNvGrpSpPr/>
+        <p:nvPr/>
+      </p:nvGrpSpPr>
+      <p:grpSpPr>
+        <a:xfrm>
+          <a:off x="0" y="0"/>
+          <a:ext cx="0" cy="0"/>
+          <a:chOff x="0" y="0"/>
+          <a:chExt cx="0" cy="0"/>
+        </a:xfrm>
+      </p:grpSpPr>
+      <p:sp>
+        <p:nvSpPr>
+          <p:cNvPr id="11" name="Rectangle 10">
+            <a:extLst>
+              <a:ext uri="{FF2B5EF4-FFF2-40B4-BE49-F238E27FC236}">
+                <a16:creationId xmlns:a16="http://schemas.microsoft.com/office/drawing/2014/main" id="{2A8AA5BC-4F7A-4226-8F99-6D824B226A97}"/>
+              </a:ext>
+              <a:ext uri="{C183D7F6-B498-43B3-948B-1728B52AA6E4}">
+                <adec:decorative xmlns:adec="http://schemas.microsoft.com/office/drawing/2017/decorative" val="1"/>
+              </a:ext>
+            </a:extLst>
+          </p:cNvPr>
+          <p:cNvSpPr>
+            <a:spLocks noGrp="1" noRot="1" noChangeAspect="1" noMove="1" noResize="1" noEditPoints="1" noAdjustHandles="1" noChangeArrowheads="1" noChangeShapeType="1" noTextEdit="1"/>
+          </p:cNvSpPr>
+          <p:nvPr>
+            <p:extLst>
+              <p:ext uri="{386F3935-93C4-4BCD-93E2-E3B085C9AB24}">
+                <p16:designElem xmlns:p16="http://schemas.microsoft.com/office/powerpoint/2015/main" val="1"/>
+              </p:ext>
+            </p:extLst>
+          </p:nvPr>
+        </p:nvSpPr>
+        <p:spPr>
+          <a:xfrm>
+            <a:off x="0" y="-3324"/>
+            <a:ext cx="12192000" cy="6861324"/>
+          </a:xfrm>
+          <a:prstGeom prst="rect">
+            <a:avLst/>
+          </a:prstGeom>
+          <a:solidFill>
+            <a:schemeClr val="tx1"/>
+          </a:solidFill>
+          <a:ln>
+            <a:noFill/>
+          </a:ln>
+        </p:spPr>
+        <p:style>
+          <a:lnRef idx="2">
+            <a:schemeClr val="accent1">
+              <a:shade val="50000"/>
+            </a:schemeClr>
+          </a:lnRef>
+          <a:fillRef idx="1">
+            <a:schemeClr val="accent1"/>
+          </a:fillRef>
+          <a:effectRef idx="0">
+            <a:schemeClr val="accent1"/>
+          </a:effectRef>
+          <a:fontRef idx="minor">
+            <a:schemeClr val="lt1"/>
+          </a:fontRef>
+        </p:style>
+        <p:txBody>
+          <a:bodyPr rtlCol="0" anchor="ctr"/>
+          <a:lstStyle/>
+          <a:p>
+            <a:pPr algn="ctr"/>
+            <a:endParaRPr lang="en-US"/>
+          </a:p>
+        </p:txBody>
+      </p:sp>
+      <p:sp>
+        <p:nvSpPr>
+          <p:cNvPr id="13" name="Rectangle 12">
+            <a:extLst>
+              <a:ext uri="{FF2B5EF4-FFF2-40B4-BE49-F238E27FC236}">
+                <a16:creationId xmlns:a16="http://schemas.microsoft.com/office/drawing/2014/main" id="{3E5445C6-DD42-4979-86FF-03730E8C6DB0}"/>
+              </a:ext>
+              <a:ext uri="{C183D7F6-B498-43B3-948B-1728B52AA6E4}">
+                <adec:decorative xmlns:adec="http://schemas.microsoft.com/office/drawing/2017/decorative" val="1"/>
+              </a:ext>
+            </a:extLst>
+          </p:cNvPr>
+          <p:cNvSpPr>
+            <a:spLocks noGrp="1" noRot="1" noChangeAspect="1" noMove="1" noResize="1" noEditPoints="1" noAdjustHandles="1" noChangeArrowheads="1" noChangeShapeType="1" noTextEdit="1"/>
+          </p:cNvSpPr>
+          <p:nvPr>
+            <p:extLst>
+              <p:ext uri="{386F3935-93C4-4BCD-93E2-E3B085C9AB24}">
+                <p16:designElem xmlns:p16="http://schemas.microsoft.com/office/powerpoint/2015/main" val="1"/>
+              </p:ext>
+            </p:extLst>
+          </p:nvPr>
+        </p:nvSpPr>
+        <p:spPr bwMode="ltGray">
+          <a:xfrm>
+            <a:off x="321734" y="321733"/>
+            <a:ext cx="11573488" cy="6214534"/>
+          </a:xfrm>
+          <a:prstGeom prst="rect">
+            <a:avLst/>
+          </a:prstGeom>
+          <a:solidFill>
+            <a:schemeClr val="bg1">
+              <a:lumMod val="75000"/>
+              <a:lumOff val="25000"/>
+            </a:schemeClr>
+          </a:solidFill>
+          <a:ln w="127000" cap="sq" cmpd="thinThick">
+            <a:solidFill>
+              <a:schemeClr val="bg1">
+                <a:lumMod val="75000"/>
+                <a:lumOff val="25000"/>
+              </a:schemeClr>
+            </a:solidFill>
+          </a:ln>
+        </p:spPr>
+        <p:style>
+          <a:lnRef idx="2">
+            <a:schemeClr val="accent1">
+              <a:shade val="50000"/>
+            </a:schemeClr>
+          </a:lnRef>
+          <a:fillRef idx="1">
+            <a:schemeClr val="accent1"/>
+          </a:fillRef>
+          <a:effectRef idx="0">
+            <a:schemeClr val="accent1"/>
+          </a:effectRef>
+          <a:fontRef idx="minor">
+            <a:schemeClr val="lt1"/>
+          </a:fontRef>
+        </p:style>
+        <p:txBody>
+          <a:bodyPr rtlCol="0" anchor="ctr"/>
+          <a:lstStyle/>
+          <a:p>
+            <a:pPr algn="ctr"/>
+            <a:endParaRPr lang="en-US"/>
+          </a:p>
+        </p:txBody>
+      </p:sp>
+      <p:sp>
+        <p:nvSpPr>
+          <p:cNvPr id="5" name="Title 4">
+            <a:extLst>
+              <a:ext uri="{FF2B5EF4-FFF2-40B4-BE49-F238E27FC236}">
+                <a16:creationId xmlns:a16="http://schemas.microsoft.com/office/drawing/2014/main" id="{7D0A3495-2352-40A8-BC46-9DFF34FA195E}"/>
+              </a:ext>
+            </a:extLst>
+          </p:cNvPr>
+          <p:cNvSpPr>
+            <a:spLocks noGrp="1"/>
+          </p:cNvSpPr>
+          <p:nvPr>
+            <p:ph type="title"/>
+          </p:nvPr>
+        </p:nvSpPr>
+        <p:spPr>
+          <a:xfrm>
+            <a:off x="1524000" y="807500"/>
+            <a:ext cx="9144000" cy="2991123"/>
+          </a:xfrm>
+        </p:spPr>
+        <p:txBody>
+          <a:bodyPr vert="horz" lIns="91440" tIns="45720" rIns="91440" bIns="45720" rtlCol="0" anchor="b">
+            <a:normAutofit fontScale="90000"/>
+          </a:bodyPr>
+          <a:lstStyle/>
+          <a:p>
+            <a:pPr algn="ctr"/>
+            <a:r>
+              <a:rPr lang="en-US" sz="5800" dirty="0"/>
+              <a:t>Can Iowa State use data on released prisoners to predict which prisoners will return to a life of crime?</a:t>
+            </a:r>
+          </a:p>
+        </p:txBody>
+      </p:sp>
+      <p:sp>
+        <p:nvSpPr>
+          <p:cNvPr id="6" name="Text Placeholder 5">
+            <a:extLst>
+              <a:ext uri="{FF2B5EF4-FFF2-40B4-BE49-F238E27FC236}">
+                <a16:creationId xmlns:a16="http://schemas.microsoft.com/office/drawing/2014/main" id="{E4BA91B1-1050-4982-93E7-2BC0AFBB9C06}"/>
+              </a:ext>
+            </a:extLst>
+          </p:cNvPr>
+          <p:cNvSpPr>
+            <a:spLocks noGrp="1"/>
+          </p:cNvSpPr>
+          <p:nvPr>
+            <p:ph type="body" idx="1"/>
+          </p:nvPr>
+        </p:nvSpPr>
+        <p:spPr>
+          <a:xfrm>
+            <a:off x="409575" y="4550387"/>
+            <a:ext cx="11372850" cy="1544910"/>
+          </a:xfrm>
+        </p:spPr>
+        <p:txBody>
+          <a:bodyPr vert="horz" lIns="91440" tIns="45720" rIns="91440" bIns="45720" rtlCol="0">
+            <a:normAutofit/>
+          </a:bodyPr>
+          <a:lstStyle/>
+          <a:p>
+            <a:pPr algn="ctr"/>
+            <a:r>
+              <a:rPr lang="en-IN" sz="4400" b="1" kern="1200" dirty="0">
+                <a:solidFill>
+                  <a:schemeClr val="accent1"/>
+                </a:solidFill>
+                <a:latin typeface="+mn-lt"/>
+                <a:ea typeface="+mn-ea"/>
+                <a:cs typeface="+mn-cs"/>
+              </a:rPr>
+              <a:t>FUNDAMENTAL QUESTION</a:t>
+            </a:r>
+            <a:endParaRPr lang="en-US" sz="4400" b="1" kern="1200" dirty="0">
+              <a:solidFill>
+                <a:schemeClr val="accent1"/>
+              </a:solidFill>
+              <a:latin typeface="+mn-lt"/>
+              <a:ea typeface="+mn-ea"/>
+              <a:cs typeface="+mn-cs"/>
+            </a:endParaRPr>
+          </a:p>
+        </p:txBody>
+      </p:sp>
+      <p:cxnSp>
+        <p:nvCxnSpPr>
+          <p:cNvPr id="15" name="Straight Connector 14">
+            <a:extLst>
+              <a:ext uri="{FF2B5EF4-FFF2-40B4-BE49-F238E27FC236}">
+                <a16:creationId xmlns:a16="http://schemas.microsoft.com/office/drawing/2014/main" id="{45000665-DFC7-417E-8FD7-516A0F15C975}"/>
+              </a:ext>
+              <a:ext uri="{C183D7F6-B498-43B3-948B-1728B52AA6E4}">
+                <adec:decorative xmlns:adec="http://schemas.microsoft.com/office/drawing/2017/decorative" val="1"/>
+              </a:ext>
+            </a:extLst>
+          </p:cNvPr>
+          <p:cNvCxnSpPr>
+            <a:cxnSpLocks noGrp="1" noRot="1" noChangeAspect="1" noMove="1" noResize="1" noEditPoints="1" noAdjustHandles="1" noChangeArrowheads="1" noChangeShapeType="1"/>
+          </p:cNvCxnSpPr>
+          <p:nvPr>
+            <p:extLst>
+              <p:ext uri="{386F3935-93C4-4BCD-93E2-E3B085C9AB24}">
+                <p16:designElem xmlns:p16="http://schemas.microsoft.com/office/powerpoint/2015/main" val="1"/>
+              </p:ext>
+            </p:extLst>
+          </p:nvPr>
+        </p:nvCxnSpPr>
+        <p:spPr>
+          <a:xfrm>
+            <a:off x="4724400" y="4109417"/>
+            <a:ext cx="2743200" cy="0"/>
+          </a:xfrm>
+          <a:prstGeom prst="line">
+            <a:avLst/>
+          </a:prstGeom>
+          <a:ln w="12700">
+            <a:solidFill>
+              <a:schemeClr val="tx1">
+                <a:lumMod val="85000"/>
+              </a:schemeClr>
+            </a:solidFill>
+          </a:ln>
+        </p:spPr>
+        <p:style>
+          <a:lnRef idx="1">
+            <a:schemeClr val="accent1"/>
+          </a:lnRef>
+          <a:fillRef idx="0">
+            <a:schemeClr val="accent1"/>
+          </a:fillRef>
+          <a:effectRef idx="0">
+            <a:schemeClr val="accent1"/>
+          </a:effectRef>
+          <a:fontRef idx="minor">
+            <a:schemeClr val="tx1"/>
+          </a:fontRef>
+        </p:style>
+      </p:cxnSp>
+    </p:spTree>
+    <p:extLst>
+      <p:ext uri="{BB962C8B-B14F-4D97-AF65-F5344CB8AC3E}">
+        <p14:creationId xmlns:p14="http://schemas.microsoft.com/office/powerpoint/2010/main" val="3658807690"/>
+      </p:ext>
+    </p:extLst>
+  </p:cSld>
+  <p:clrMapOvr>
+    <a:overrideClrMapping bg1="dk1" tx1="lt1" bg2="dk2" tx2="lt2" accent1="accent1" accent2="accent2" accent3="accent3" accent4="accent4" accent5="accent5" accent6="accent6" hlink="hlink" folHlink="folHlink"/>
+  </p:clrMapOvr>
+</p:sld>
+</file>
+
+<file path=ppt/slides/slide3.xml><?xml version="1.0" encoding="utf-8"?>
 <p:sld xmlns:a="http://schemas.openxmlformats.org/drawingml/2006/main" xmlns:r="http://schemas.openxmlformats.org/officeDocument/2006/relationships" xmlns:p="http://schemas.openxmlformats.org/presentationml/2006/main">
   <p:cSld>
     <p:bg>
@@ -4075,9 +4392,17 @@
 </p:sld>
 </file>
 
-<file path=ppt/slides/slide3.xml><?xml version="1.0" encoding="utf-8"?>
+<file path=ppt/slides/slide4.xml><?xml version="1.0" encoding="utf-8"?>
 <p:sld xmlns:a="http://schemas.openxmlformats.org/drawingml/2006/main" xmlns:r="http://schemas.openxmlformats.org/officeDocument/2006/relationships" xmlns:p="http://schemas.openxmlformats.org/presentationml/2006/main">
   <p:cSld>
+    <p:bg>
+      <p:bgPr>
+        <a:solidFill>
+          <a:schemeClr val="bg1"/>
+        </a:solidFill>
+        <a:effectLst/>
+      </p:bgPr>
+    </p:bg>
     <p:spTree>
       <p:nvGrpSpPr>
         <p:cNvPr id="1" name=""/>
@@ -4094,6 +4419,70 @@
       </p:grpSpPr>
       <p:sp>
         <p:nvSpPr>
+          <p:cNvPr id="11" name="Rectangle 10">
+            <a:extLst>
+              <a:ext uri="{FF2B5EF4-FFF2-40B4-BE49-F238E27FC236}">
+                <a16:creationId xmlns:a16="http://schemas.microsoft.com/office/drawing/2014/main" id="{867D4867-5BA7-4462-B2F6-A23F4A622AA7}"/>
+              </a:ext>
+              <a:ext uri="{C183D7F6-B498-43B3-948B-1728B52AA6E4}">
+                <adec:decorative xmlns:adec="http://schemas.microsoft.com/office/drawing/2017/decorative" val="1"/>
+              </a:ext>
+            </a:extLst>
+          </p:cNvPr>
+          <p:cNvSpPr>
+            <a:spLocks noGrp="1" noRot="1" noChangeAspect="1" noMove="1" noResize="1" noEditPoints="1" noAdjustHandles="1" noChangeArrowheads="1" noChangeShapeType="1" noTextEdit="1"/>
+          </p:cNvSpPr>
+          <p:nvPr>
+            <p:extLst>
+              <p:ext uri="{386F3935-93C4-4BCD-93E2-E3B085C9AB24}">
+                <p16:designElem xmlns:p16="http://schemas.microsoft.com/office/powerpoint/2015/main" val="1"/>
+              </p:ext>
+            </p:extLst>
+          </p:nvPr>
+        </p:nvSpPr>
+        <p:spPr>
+          <a:xfrm>
+            <a:off x="0" y="0"/>
+            <a:ext cx="4654296" cy="6858000"/>
+          </a:xfrm>
+          <a:prstGeom prst="rect">
+            <a:avLst/>
+          </a:prstGeom>
+          <a:solidFill>
+            <a:schemeClr val="tx1">
+              <a:lumMod val="75000"/>
+              <a:lumOff val="25000"/>
+            </a:schemeClr>
+          </a:solidFill>
+          <a:ln>
+            <a:noFill/>
+          </a:ln>
+        </p:spPr>
+        <p:style>
+          <a:lnRef idx="0">
+            <a:scrgbClr r="0" g="0" b="0"/>
+          </a:lnRef>
+          <a:fillRef idx="0">
+            <a:scrgbClr r="0" g="0" b="0"/>
+          </a:fillRef>
+          <a:effectRef idx="0">
+            <a:scrgbClr r="0" g="0" b="0"/>
+          </a:effectRef>
+          <a:fontRef idx="minor">
+            <a:schemeClr val="lt1"/>
+          </a:fontRef>
+        </p:style>
+        <p:txBody>
+          <a:bodyPr rtlCol="0" anchor="ctr"/>
+          <a:lstStyle/>
+          <a:p>
+            <a:pPr algn="ctr"/>
+            <a:endParaRPr lang="en-US"/>
+          </a:p>
+        </p:txBody>
+      </p:sp>
+      <p:sp>
+        <p:nvSpPr>
           <p:cNvPr id="2" name="Title 1">
             <a:extLst>
               <a:ext uri="{FF2B5EF4-FFF2-40B4-BE49-F238E27FC236}">
@@ -4108,62 +4497,234 @@
             <p:ph type="title"/>
           </p:nvPr>
         </p:nvSpPr>
-        <p:spPr/>
-        <p:txBody>
-          <a:bodyPr/>
-          <a:lstStyle/>
-          <a:p>
-            <a:endParaRPr lang="en-US"/>
-          </a:p>
-        </p:txBody>
-      </p:sp>
-      <p:sp>
-        <p:nvSpPr>
-          <p:cNvPr id="3" name="Content Placeholder 2">
-            <a:extLst>
-              <a:ext uri="{FF2B5EF4-FFF2-40B4-BE49-F238E27FC236}">
-                <a16:creationId xmlns:a16="http://schemas.microsoft.com/office/drawing/2014/main" id="{7F7A2F37-943D-4876-95BA-A2B9433F8E61}"/>
-              </a:ext>
-            </a:extLst>
-          </p:cNvPr>
-          <p:cNvSpPr>
-            <a:spLocks noGrp="1"/>
-          </p:cNvSpPr>
+        <p:spPr>
+          <a:xfrm>
+            <a:off x="643467" y="643467"/>
+            <a:ext cx="3363974" cy="1597315"/>
+          </a:xfrm>
+          <a:noFill/>
+          <a:ln w="19050">
+            <a:solidFill>
+              <a:schemeClr val="bg1"/>
+            </a:solidFill>
+          </a:ln>
+        </p:spPr>
+        <p:txBody>
+          <a:bodyPr vert="horz" wrap="square" lIns="91440" tIns="45720" rIns="91440" bIns="45720" rtlCol="0" anchor="ctr">
+            <a:normAutofit/>
+          </a:bodyPr>
+          <a:lstStyle/>
+          <a:p>
+            <a:pPr algn="ctr"/>
+            <a:r>
+              <a:rPr lang="en-US" sz="2800" kern="1200" dirty="0">
+                <a:solidFill>
+                  <a:schemeClr val="bg1"/>
+                </a:solidFill>
+                <a:latin typeface="+mj-lt"/>
+                <a:ea typeface="+mj-ea"/>
+                <a:cs typeface="+mj-cs"/>
+              </a:rPr>
+              <a:t>Important Features</a:t>
+            </a:r>
+            <a:br>
+              <a:rPr lang="en-US" sz="2800" kern="1200" dirty="0">
+                <a:solidFill>
+                  <a:schemeClr val="bg1"/>
+                </a:solidFill>
+                <a:latin typeface="+mj-lt"/>
+                <a:ea typeface="+mj-ea"/>
+                <a:cs typeface="+mj-cs"/>
+              </a:rPr>
+            </a:br>
+            <a:r>
+              <a:rPr lang="en-US" sz="2800" kern="1200" dirty="0">
+                <a:solidFill>
+                  <a:schemeClr val="bg1"/>
+                </a:solidFill>
+                <a:latin typeface="+mj-lt"/>
+                <a:ea typeface="+mj-ea"/>
+                <a:cs typeface="+mj-cs"/>
+              </a:rPr>
+              <a:t>in Predicting Recidivism</a:t>
+            </a:r>
+          </a:p>
+        </p:txBody>
+      </p:sp>
+      <p:sp>
+        <p:nvSpPr>
+          <p:cNvPr id="4" name="Content Placeholder 3">
+            <a:extLst>
+              <a:ext uri="{FF2B5EF4-FFF2-40B4-BE49-F238E27FC236}">
+                <a16:creationId xmlns:a16="http://schemas.microsoft.com/office/drawing/2014/main" id="{04CC3BF9-8B70-4A40-99D2-806B625D03CB}"/>
+              </a:ext>
+            </a:extLst>
+          </p:cNvPr>
+          <p:cNvSpPr>
+            <a:spLocks noGrp="1"/>
+          </p:cNvSpPr>
+          <p:nvPr>
+            <p:ph sz="half" idx="2"/>
+          </p:nvPr>
+        </p:nvSpPr>
+        <p:spPr>
+          <a:xfrm>
+            <a:off x="643468" y="2638044"/>
+            <a:ext cx="3363974" cy="3415622"/>
+          </a:xfrm>
+        </p:spPr>
+        <p:txBody>
+          <a:bodyPr vert="horz" lIns="91440" tIns="45720" rIns="91440" bIns="45720" rtlCol="0">
+            <a:normAutofit/>
+          </a:bodyPr>
+          <a:lstStyle/>
+          <a:p>
+            <a:r>
+              <a:rPr lang="en-US" sz="2000" dirty="0">
+                <a:solidFill>
+                  <a:schemeClr val="bg1"/>
+                </a:solidFill>
+              </a:rPr>
+              <a:t>Age-At-Release Most important.</a:t>
+            </a:r>
+          </a:p>
+          <a:p>
+            <a:r>
+              <a:rPr lang="en-US" sz="2000" dirty="0">
+                <a:solidFill>
+                  <a:schemeClr val="bg1"/>
+                </a:solidFill>
+              </a:rPr>
+              <a:t>Supervising Judicial District </a:t>
+            </a:r>
+          </a:p>
+          <a:p>
+            <a:r>
+              <a:rPr lang="en-US" sz="2000" dirty="0">
+                <a:solidFill>
+                  <a:schemeClr val="bg1"/>
+                </a:solidFill>
+              </a:rPr>
+              <a:t> Type of Release</a:t>
+            </a:r>
+          </a:p>
+          <a:p>
+            <a:r>
+              <a:rPr lang="en-US" sz="2000" dirty="0">
+                <a:solidFill>
+                  <a:schemeClr val="bg1"/>
+                </a:solidFill>
+              </a:rPr>
+              <a:t>Crime Subtypes</a:t>
+            </a:r>
+          </a:p>
+        </p:txBody>
+      </p:sp>
+      <p:pic>
+        <p:nvPicPr>
+          <p:cNvPr id="6" name="Content Placeholder 5" descr="A screenshot of a cell phone&#10;&#10;Description automatically generated">
+            <a:extLst>
+              <a:ext uri="{FF2B5EF4-FFF2-40B4-BE49-F238E27FC236}">
+                <a16:creationId xmlns:a16="http://schemas.microsoft.com/office/drawing/2014/main" id="{244D33CB-DAD1-4815-A7A9-B24FAEFA9967}"/>
+              </a:ext>
+            </a:extLst>
+          </p:cNvPr>
+          <p:cNvPicPr>
+            <a:picLocks noGrp="1" noChangeAspect="1"/>
+          </p:cNvPicPr>
           <p:nvPr>
             <p:ph sz="half" idx="1"/>
           </p:nvPr>
-        </p:nvSpPr>
-        <p:spPr/>
-        <p:txBody>
-          <a:bodyPr/>
-          <a:lstStyle/>
-          <a:p>
-            <a:endParaRPr lang="en-US"/>
-          </a:p>
-        </p:txBody>
-      </p:sp>
-      <p:sp>
-        <p:nvSpPr>
-          <p:cNvPr id="4" name="Content Placeholder 3">
-            <a:extLst>
-              <a:ext uri="{FF2B5EF4-FFF2-40B4-BE49-F238E27FC236}">
-                <a16:creationId xmlns:a16="http://schemas.microsoft.com/office/drawing/2014/main" id="{04CC3BF9-8B70-4A40-99D2-806B625D03CB}"/>
-              </a:ext>
-            </a:extLst>
-          </p:cNvPr>
-          <p:cNvSpPr>
-            <a:spLocks noGrp="1"/>
-          </p:cNvSpPr>
-          <p:nvPr>
-            <p:ph sz="half" idx="2"/>
-          </p:nvPr>
-        </p:nvSpPr>
-        <p:spPr/>
-        <p:txBody>
-          <a:bodyPr/>
-          <a:lstStyle/>
-          <a:p>
-            <a:endParaRPr lang="en-US"/>
+        </p:nvPicPr>
+        <p:blipFill>
+          <a:blip r:embed="rId2">
+            <a:extLst>
+              <a:ext uri="{28A0092B-C50C-407E-A947-70E740481C1C}">
+                <a14:useLocalDpi xmlns:a14="http://schemas.microsoft.com/office/drawing/2010/main" val="0"/>
+              </a:ext>
+            </a:extLst>
+          </a:blip>
+          <a:stretch>
+            <a:fillRect/>
+          </a:stretch>
+        </p:blipFill>
+        <p:spPr>
+          <a:xfrm>
+            <a:off x="5297763" y="1120259"/>
+            <a:ext cx="6902736" cy="4365981"/>
+          </a:xfrm>
+          <a:prstGeom prst="rect">
+            <a:avLst/>
+          </a:prstGeom>
+        </p:spPr>
+      </p:pic>
+      <p:sp>
+        <p:nvSpPr>
+          <p:cNvPr id="7" name="TextBox 6">
+            <a:extLst>
+              <a:ext uri="{FF2B5EF4-FFF2-40B4-BE49-F238E27FC236}">
+                <a16:creationId xmlns:a16="http://schemas.microsoft.com/office/drawing/2014/main" id="{4EFC16D5-9417-43FE-8C09-14696204C46E}"/>
+              </a:ext>
+            </a:extLst>
+          </p:cNvPr>
+          <p:cNvSpPr txBox="1"/>
+          <p:nvPr/>
+        </p:nvSpPr>
+        <p:spPr>
+          <a:xfrm>
+            <a:off x="8156098" y="5368409"/>
+            <a:ext cx="2040815" cy="369332"/>
+          </a:xfrm>
+          <a:prstGeom prst="rect">
+            <a:avLst/>
+          </a:prstGeom>
+          <a:noFill/>
+        </p:spPr>
+        <p:txBody>
+          <a:bodyPr wrap="none" rtlCol="0">
+            <a:spAutoFit/>
+          </a:bodyPr>
+          <a:lstStyle/>
+          <a:p>
+            <a:r>
+              <a:rPr lang="en-US" dirty="0"/>
+              <a:t>Feature Importance</a:t>
+            </a:r>
+          </a:p>
+        </p:txBody>
+      </p:sp>
+      <p:sp>
+        <p:nvSpPr>
+          <p:cNvPr id="9" name="TextBox 8">
+            <a:extLst>
+              <a:ext uri="{FF2B5EF4-FFF2-40B4-BE49-F238E27FC236}">
+                <a16:creationId xmlns:a16="http://schemas.microsoft.com/office/drawing/2014/main" id="{65B69289-A3DA-4FA0-A28F-EDC42D4A7005}"/>
+              </a:ext>
+            </a:extLst>
+          </p:cNvPr>
+          <p:cNvSpPr txBox="1"/>
+          <p:nvPr/>
+        </p:nvSpPr>
+        <p:spPr>
+          <a:xfrm rot="16200000">
+            <a:off x="4355775" y="2939374"/>
+            <a:ext cx="1514645" cy="369332"/>
+          </a:xfrm>
+          <a:prstGeom prst="rect">
+            <a:avLst/>
+          </a:prstGeom>
+          <a:noFill/>
+        </p:spPr>
+        <p:txBody>
+          <a:bodyPr wrap="none" rtlCol="0">
+            <a:spAutoFit/>
+          </a:bodyPr>
+          <a:lstStyle/>
+          <a:p>
+            <a:r>
+              <a:rPr lang="en-US" dirty="0"/>
+              <a:t>Feature Name</a:t>
+            </a:r>
           </a:p>
         </p:txBody>
       </p:sp>
@@ -4176,6 +4737,1343 @@
   </p:cSld>
   <p:clrMapOvr>
     <a:masterClrMapping/>
+  </p:clrMapOvr>
+</p:sld>
+</file>
+
+<file path=ppt/slides/slide5.xml><?xml version="1.0" encoding="utf-8"?>
+<p:sld xmlns:a="http://schemas.openxmlformats.org/drawingml/2006/main" xmlns:r="http://schemas.openxmlformats.org/officeDocument/2006/relationships" xmlns:p="http://schemas.openxmlformats.org/presentationml/2006/main">
+  <p:cSld>
+    <p:bg>
+      <p:bgPr>
+        <a:solidFill>
+          <a:schemeClr val="bg1"/>
+        </a:solidFill>
+        <a:effectLst/>
+      </p:bgPr>
+    </p:bg>
+    <p:spTree>
+      <p:nvGrpSpPr>
+        <p:cNvPr id="1" name=""/>
+        <p:cNvGrpSpPr/>
+        <p:nvPr/>
+      </p:nvGrpSpPr>
+      <p:grpSpPr>
+        <a:xfrm>
+          <a:off x="0" y="0"/>
+          <a:ext cx="0" cy="0"/>
+          <a:chOff x="0" y="0"/>
+          <a:chExt cx="0" cy="0"/>
+        </a:xfrm>
+      </p:grpSpPr>
+      <p:sp>
+        <p:nvSpPr>
+          <p:cNvPr id="26" name="Rectangle 25">
+            <a:extLst>
+              <a:ext uri="{FF2B5EF4-FFF2-40B4-BE49-F238E27FC236}">
+                <a16:creationId xmlns:a16="http://schemas.microsoft.com/office/drawing/2014/main" id="{823AC064-BC96-4F32-8AE1-B2FD38754823}"/>
+              </a:ext>
+              <a:ext uri="{C183D7F6-B498-43B3-948B-1728B52AA6E4}">
+                <adec:decorative xmlns:adec="http://schemas.microsoft.com/office/drawing/2017/decorative" val="1"/>
+              </a:ext>
+            </a:extLst>
+          </p:cNvPr>
+          <p:cNvSpPr>
+            <a:spLocks noGrp="1" noRot="1" noChangeAspect="1" noMove="1" noResize="1" noEditPoints="1" noAdjustHandles="1" noChangeArrowheads="1" noChangeShapeType="1" noTextEdit="1"/>
+          </p:cNvSpPr>
+          <p:nvPr>
+            <p:extLst>
+              <p:ext uri="{386F3935-93C4-4BCD-93E2-E3B085C9AB24}">
+                <p16:designElem xmlns:p16="http://schemas.microsoft.com/office/powerpoint/2015/main" val="1"/>
+              </p:ext>
+            </p:extLst>
+          </p:nvPr>
+        </p:nvSpPr>
+        <p:spPr bwMode="ltGray">
+          <a:xfrm>
+            <a:off x="396882" y="280374"/>
+            <a:ext cx="11438793" cy="1844256"/>
+          </a:xfrm>
+          <a:prstGeom prst="rect">
+            <a:avLst/>
+          </a:prstGeom>
+          <a:solidFill>
+            <a:srgbClr val="404040"/>
+          </a:solidFill>
+          <a:ln w="127000" cap="sq" cmpd="thinThick">
+            <a:solidFill>
+              <a:srgbClr val="404040"/>
+            </a:solidFill>
+          </a:ln>
+        </p:spPr>
+        <p:style>
+          <a:lnRef idx="2">
+            <a:schemeClr val="accent1">
+              <a:shade val="50000"/>
+            </a:schemeClr>
+          </a:lnRef>
+          <a:fillRef idx="1">
+            <a:schemeClr val="accent1"/>
+          </a:fillRef>
+          <a:effectRef idx="0">
+            <a:schemeClr val="accent1"/>
+          </a:effectRef>
+          <a:fontRef idx="minor">
+            <a:schemeClr val="lt1"/>
+          </a:fontRef>
+        </p:style>
+        <p:txBody>
+          <a:bodyPr rtlCol="0" anchor="ctr"/>
+          <a:lstStyle/>
+          <a:p>
+            <a:pPr algn="ctr"/>
+            <a:endParaRPr lang="en-US"/>
+          </a:p>
+        </p:txBody>
+      </p:sp>
+      <p:sp>
+        <p:nvSpPr>
+          <p:cNvPr id="2" name="Title 1">
+            <a:extLst>
+              <a:ext uri="{FF2B5EF4-FFF2-40B4-BE49-F238E27FC236}">
+                <a16:creationId xmlns:a16="http://schemas.microsoft.com/office/drawing/2014/main" id="{6D68BEC9-51A3-41D0-B106-455D50898E30}"/>
+              </a:ext>
+            </a:extLst>
+          </p:cNvPr>
+          <p:cNvSpPr>
+            <a:spLocks noGrp="1"/>
+          </p:cNvSpPr>
+          <p:nvPr>
+            <p:ph type="title"/>
+          </p:nvPr>
+        </p:nvSpPr>
+        <p:spPr>
+          <a:xfrm>
+            <a:off x="546351" y="433545"/>
+            <a:ext cx="11139854" cy="930447"/>
+          </a:xfrm>
+        </p:spPr>
+        <p:txBody>
+          <a:bodyPr vert="horz" lIns="91440" tIns="45720" rIns="91440" bIns="45720" rtlCol="0" anchor="b">
+            <a:normAutofit/>
+          </a:bodyPr>
+          <a:lstStyle/>
+          <a:p>
+            <a:pPr algn="ctr"/>
+            <a:r>
+              <a:rPr lang="en-US" sz="5400" dirty="0">
+                <a:solidFill>
+                  <a:srgbClr val="FFFFFF"/>
+                </a:solidFill>
+              </a:rPr>
+              <a:t>Machine Learning Model Performance</a:t>
+            </a:r>
+          </a:p>
+        </p:txBody>
+      </p:sp>
+      <p:cxnSp>
+        <p:nvCxnSpPr>
+          <p:cNvPr id="28" name="Straight Connector 27">
+            <a:extLst>
+              <a:ext uri="{FF2B5EF4-FFF2-40B4-BE49-F238E27FC236}">
+                <a16:creationId xmlns:a16="http://schemas.microsoft.com/office/drawing/2014/main" id="{7E7C77BC-7138-40B1-A15B-20F57A494629}"/>
+              </a:ext>
+              <a:ext uri="{C183D7F6-B498-43B3-948B-1728B52AA6E4}">
+                <adec:decorative xmlns:adec="http://schemas.microsoft.com/office/drawing/2017/decorative" val="1"/>
+              </a:ext>
+            </a:extLst>
+          </p:cNvPr>
+          <p:cNvCxnSpPr>
+            <a:cxnSpLocks noGrp="1" noRot="1" noChangeAspect="1" noMove="1" noResize="1" noEditPoints="1" noAdjustHandles="1" noChangeArrowheads="1" noChangeShapeType="1"/>
+          </p:cNvCxnSpPr>
+          <p:nvPr>
+            <p:extLst>
+              <p:ext uri="{386F3935-93C4-4BCD-93E2-E3B085C9AB24}">
+                <p16:designElem xmlns:p16="http://schemas.microsoft.com/office/powerpoint/2015/main" val="1"/>
+              </p:ext>
+            </p:extLst>
+          </p:nvPr>
+        </p:nvCxnSpPr>
+        <p:spPr>
+          <a:xfrm>
+            <a:off x="2230078" y="1522292"/>
+            <a:ext cx="7772400" cy="0"/>
+          </a:xfrm>
+          <a:prstGeom prst="line">
+            <a:avLst/>
+          </a:prstGeom>
+          <a:ln w="22225">
+            <a:solidFill>
+              <a:srgbClr val="D9D9D9"/>
+            </a:solidFill>
+          </a:ln>
+        </p:spPr>
+        <p:style>
+          <a:lnRef idx="1">
+            <a:schemeClr val="accent1"/>
+          </a:lnRef>
+          <a:fillRef idx="0">
+            <a:schemeClr val="accent1"/>
+          </a:fillRef>
+          <a:effectRef idx="0">
+            <a:schemeClr val="accent1"/>
+          </a:effectRef>
+          <a:fontRef idx="minor">
+            <a:schemeClr val="tx1"/>
+          </a:fontRef>
+        </p:style>
+      </p:cxnSp>
+      <p:pic>
+        <p:nvPicPr>
+          <p:cNvPr id="21" name="Content Placeholder 5" descr="A screenshot of a cell phone&#10;&#10;Description automatically generated">
+            <a:extLst>
+              <a:ext uri="{FF2B5EF4-FFF2-40B4-BE49-F238E27FC236}">
+                <a16:creationId xmlns:a16="http://schemas.microsoft.com/office/drawing/2014/main" id="{37A1243E-E46A-4531-8FD2-5AD40E9600BB}"/>
+              </a:ext>
+            </a:extLst>
+          </p:cNvPr>
+          <p:cNvPicPr>
+            <a:picLocks noGrp="1" noChangeAspect="1"/>
+          </p:cNvPicPr>
+          <p:nvPr>
+            <p:ph sz="half" idx="1"/>
+          </p:nvPr>
+        </p:nvPicPr>
+        <p:blipFill>
+          <a:blip r:embed="rId2">
+            <a:extLst>
+              <a:ext uri="{28A0092B-C50C-407E-A947-70E740481C1C}">
+                <a14:useLocalDpi xmlns:a14="http://schemas.microsoft.com/office/drawing/2010/main" val="0"/>
+              </a:ext>
+            </a:extLst>
+          </a:blip>
+          <a:stretch>
+            <a:fillRect/>
+          </a:stretch>
+        </p:blipFill>
+        <p:spPr>
+          <a:xfrm>
+            <a:off x="807335" y="2426818"/>
+            <a:ext cx="4504380" cy="3997637"/>
+          </a:xfrm>
+          <a:prstGeom prst="rect">
+            <a:avLst/>
+          </a:prstGeom>
+        </p:spPr>
+      </p:pic>
+      <p:cxnSp>
+        <p:nvCxnSpPr>
+          <p:cNvPr id="30" name="Straight Connector 29">
+            <a:extLst>
+              <a:ext uri="{FF2B5EF4-FFF2-40B4-BE49-F238E27FC236}">
+                <a16:creationId xmlns:a16="http://schemas.microsoft.com/office/drawing/2014/main" id="{DB146403-F3D6-484B-B2ED-97F9565D0370}"/>
+              </a:ext>
+              <a:ext uri="{C183D7F6-B498-43B3-948B-1728B52AA6E4}">
+                <adec:decorative xmlns:adec="http://schemas.microsoft.com/office/drawing/2017/decorative" val="1"/>
+              </a:ext>
+            </a:extLst>
+          </p:cNvPr>
+          <p:cNvCxnSpPr>
+            <a:cxnSpLocks noGrp="1" noRot="1" noChangeAspect="1" noMove="1" noResize="1" noEditPoints="1" noAdjustHandles="1" noChangeArrowheads="1" noChangeShapeType="1"/>
+          </p:cNvCxnSpPr>
+          <p:nvPr>
+            <p:extLst>
+              <p:ext uri="{386F3935-93C4-4BCD-93E2-E3B085C9AB24}">
+                <p16:designElem xmlns:p16="http://schemas.microsoft.com/office/powerpoint/2015/main" val="1"/>
+              </p:ext>
+            </p:extLst>
+          </p:nvPr>
+        </p:nvCxnSpPr>
+        <p:spPr>
+          <a:xfrm>
+            <a:off x="6116278" y="2596836"/>
+            <a:ext cx="0" cy="3657600"/>
+          </a:xfrm>
+          <a:prstGeom prst="line">
+            <a:avLst/>
+          </a:prstGeom>
+          <a:ln w="101600" cmpd="dbl">
+            <a:solidFill>
+              <a:srgbClr val="595959"/>
+            </a:solidFill>
+          </a:ln>
+        </p:spPr>
+        <p:style>
+          <a:lnRef idx="1">
+            <a:schemeClr val="accent1"/>
+          </a:lnRef>
+          <a:fillRef idx="0">
+            <a:schemeClr val="accent1"/>
+          </a:fillRef>
+          <a:effectRef idx="0">
+            <a:schemeClr val="accent1"/>
+          </a:effectRef>
+          <a:fontRef idx="minor">
+            <a:schemeClr val="tx1"/>
+          </a:fontRef>
+        </p:style>
+      </p:cxnSp>
+      <p:pic>
+        <p:nvPicPr>
+          <p:cNvPr id="8" name="Content Placeholder 7" descr="A close up of a map&#10;&#10;Description automatically generated">
+            <a:extLst>
+              <a:ext uri="{FF2B5EF4-FFF2-40B4-BE49-F238E27FC236}">
+                <a16:creationId xmlns:a16="http://schemas.microsoft.com/office/drawing/2014/main" id="{5B5DE6F4-ECBC-40F7-8CE7-0036284CE8F5}"/>
+              </a:ext>
+            </a:extLst>
+          </p:cNvPr>
+          <p:cNvPicPr>
+            <a:picLocks noGrp="1" noChangeAspect="1"/>
+          </p:cNvPicPr>
+          <p:nvPr>
+            <p:ph sz="half" idx="2"/>
+          </p:nvPr>
+        </p:nvPicPr>
+        <p:blipFill>
+          <a:blip r:embed="rId3">
+            <a:extLst>
+              <a:ext uri="{28A0092B-C50C-407E-A947-70E740481C1C}">
+                <a14:useLocalDpi xmlns:a14="http://schemas.microsoft.com/office/drawing/2010/main" val="0"/>
+              </a:ext>
+            </a:extLst>
+          </a:blip>
+          <a:stretch>
+            <a:fillRect/>
+          </a:stretch>
+        </p:blipFill>
+        <p:spPr>
+          <a:xfrm>
+            <a:off x="6445073" y="2447867"/>
+            <a:ext cx="5455917" cy="3955539"/>
+          </a:xfrm>
+          <a:prstGeom prst="rect">
+            <a:avLst/>
+          </a:prstGeom>
+        </p:spPr>
+      </p:pic>
+      <p:sp>
+        <p:nvSpPr>
+          <p:cNvPr id="9" name="Rectangle 8">
+            <a:extLst>
+              <a:ext uri="{FF2B5EF4-FFF2-40B4-BE49-F238E27FC236}">
+                <a16:creationId xmlns:a16="http://schemas.microsoft.com/office/drawing/2014/main" id="{86A7E74D-84DF-49D0-A36B-6A9C5AAB1153}"/>
+              </a:ext>
+            </a:extLst>
+          </p:cNvPr>
+          <p:cNvSpPr/>
+          <p:nvPr/>
+        </p:nvSpPr>
+        <p:spPr>
+          <a:xfrm>
+            <a:off x="1099039" y="4167554"/>
+            <a:ext cx="3541542" cy="1503484"/>
+          </a:xfrm>
+          <a:prstGeom prst="rect">
+            <a:avLst/>
+          </a:prstGeom>
+          <a:noFill/>
+          <a:ln w="38100">
+            <a:solidFill>
+              <a:schemeClr val="accent6">
+                <a:lumMod val="75000"/>
+              </a:schemeClr>
+            </a:solidFill>
+          </a:ln>
+        </p:spPr>
+        <p:style>
+          <a:lnRef idx="2">
+            <a:schemeClr val="accent1">
+              <a:shade val="50000"/>
+            </a:schemeClr>
+          </a:lnRef>
+          <a:fillRef idx="1">
+            <a:schemeClr val="accent1"/>
+          </a:fillRef>
+          <a:effectRef idx="0">
+            <a:schemeClr val="accent1"/>
+          </a:effectRef>
+          <a:fontRef idx="minor">
+            <a:schemeClr val="lt1"/>
+          </a:fontRef>
+        </p:style>
+        <p:txBody>
+          <a:bodyPr rtlCol="0" anchor="ctr"/>
+          <a:lstStyle/>
+          <a:p>
+            <a:pPr algn="ctr"/>
+            <a:endParaRPr lang="en-US"/>
+          </a:p>
+        </p:txBody>
+      </p:sp>
+      <p:sp>
+        <p:nvSpPr>
+          <p:cNvPr id="22" name="Rectangle 21">
+            <a:extLst>
+              <a:ext uri="{FF2B5EF4-FFF2-40B4-BE49-F238E27FC236}">
+                <a16:creationId xmlns:a16="http://schemas.microsoft.com/office/drawing/2014/main" id="{894F1DCE-6E11-4383-80CE-A794776FE6E8}"/>
+              </a:ext>
+            </a:extLst>
+          </p:cNvPr>
+          <p:cNvSpPr/>
+          <p:nvPr/>
+        </p:nvSpPr>
+        <p:spPr>
+          <a:xfrm>
+            <a:off x="9926515" y="5574322"/>
+            <a:ext cx="1769656" cy="354797"/>
+          </a:xfrm>
+          <a:prstGeom prst="rect">
+            <a:avLst/>
+          </a:prstGeom>
+          <a:noFill/>
+          <a:ln w="38100">
+            <a:solidFill>
+              <a:schemeClr val="accent6">
+                <a:lumMod val="75000"/>
+              </a:schemeClr>
+            </a:solidFill>
+          </a:ln>
+        </p:spPr>
+        <p:style>
+          <a:lnRef idx="2">
+            <a:schemeClr val="accent1">
+              <a:shade val="50000"/>
+            </a:schemeClr>
+          </a:lnRef>
+          <a:fillRef idx="1">
+            <a:schemeClr val="accent1"/>
+          </a:fillRef>
+          <a:effectRef idx="0">
+            <a:schemeClr val="accent1"/>
+          </a:effectRef>
+          <a:fontRef idx="minor">
+            <a:schemeClr val="lt1"/>
+          </a:fontRef>
+        </p:style>
+        <p:txBody>
+          <a:bodyPr rtlCol="0" anchor="ctr"/>
+          <a:lstStyle/>
+          <a:p>
+            <a:pPr algn="ctr"/>
+            <a:endParaRPr lang="en-US"/>
+          </a:p>
+        </p:txBody>
+      </p:sp>
+    </p:spTree>
+    <p:extLst>
+      <p:ext uri="{BB962C8B-B14F-4D97-AF65-F5344CB8AC3E}">
+        <p14:creationId xmlns:p14="http://schemas.microsoft.com/office/powerpoint/2010/main" val="879329863"/>
+      </p:ext>
+    </p:extLst>
+  </p:cSld>
+  <p:clrMapOvr>
+    <a:masterClrMapping/>
+  </p:clrMapOvr>
+</p:sld>
+</file>
+
+<file path=ppt/slides/slide6.xml><?xml version="1.0" encoding="utf-8"?>
+<p:sld xmlns:a="http://schemas.openxmlformats.org/drawingml/2006/main" xmlns:r="http://schemas.openxmlformats.org/officeDocument/2006/relationships" xmlns:p="http://schemas.openxmlformats.org/presentationml/2006/main">
+  <p:cSld>
+    <p:bg>
+      <p:bgPr>
+        <a:solidFill>
+          <a:schemeClr val="bg1"/>
+        </a:solidFill>
+        <a:effectLst/>
+      </p:bgPr>
+    </p:bg>
+    <p:spTree>
+      <p:nvGrpSpPr>
+        <p:cNvPr id="1" name=""/>
+        <p:cNvGrpSpPr/>
+        <p:nvPr/>
+      </p:nvGrpSpPr>
+      <p:grpSpPr>
+        <a:xfrm>
+          <a:off x="0" y="0"/>
+          <a:ext cx="0" cy="0"/>
+          <a:chOff x="0" y="0"/>
+          <a:chExt cx="0" cy="0"/>
+        </a:xfrm>
+      </p:grpSpPr>
+      <p:sp>
+        <p:nvSpPr>
+          <p:cNvPr id="2" name="Title 1">
+            <a:extLst>
+              <a:ext uri="{FF2B5EF4-FFF2-40B4-BE49-F238E27FC236}">
+                <a16:creationId xmlns:a16="http://schemas.microsoft.com/office/drawing/2014/main" id="{10352341-E53D-4501-ACD1-CE6F881A0CD4}"/>
+              </a:ext>
+            </a:extLst>
+          </p:cNvPr>
+          <p:cNvSpPr>
+            <a:spLocks noGrp="1"/>
+          </p:cNvSpPr>
+          <p:nvPr>
+            <p:ph type="title"/>
+          </p:nvPr>
+        </p:nvSpPr>
+        <p:spPr>
+          <a:xfrm>
+            <a:off x="1571811" y="1573586"/>
+            <a:ext cx="9122584" cy="1325563"/>
+          </a:xfrm>
+        </p:spPr>
+        <p:txBody>
+          <a:bodyPr>
+            <a:normAutofit/>
+          </a:bodyPr>
+          <a:lstStyle/>
+          <a:p>
+            <a:r>
+              <a:rPr lang="en-US" dirty="0"/>
+              <a:t>Conclusions &amp; Recommendations</a:t>
+            </a:r>
+          </a:p>
+        </p:txBody>
+      </p:sp>
+      <p:sp>
+        <p:nvSpPr>
+          <p:cNvPr id="3" name="Content Placeholder 2">
+            <a:extLst>
+              <a:ext uri="{FF2B5EF4-FFF2-40B4-BE49-F238E27FC236}">
+                <a16:creationId xmlns:a16="http://schemas.microsoft.com/office/drawing/2014/main" id="{DE892EAF-AB86-4240-9A13-49A026CDBB55}"/>
+              </a:ext>
+            </a:extLst>
+          </p:cNvPr>
+          <p:cNvSpPr>
+            <a:spLocks noGrp="1"/>
+          </p:cNvSpPr>
+          <p:nvPr>
+            <p:ph idx="1"/>
+          </p:nvPr>
+        </p:nvSpPr>
+        <p:spPr>
+          <a:xfrm>
+            <a:off x="1571811" y="3060017"/>
+            <a:ext cx="6066118" cy="2438546"/>
+          </a:xfrm>
+        </p:spPr>
+        <p:txBody>
+          <a:bodyPr>
+            <a:normAutofit lnSpcReduction="10000"/>
+          </a:bodyPr>
+          <a:lstStyle/>
+          <a:p>
+            <a:r>
+              <a:rPr lang="en-IN" sz="2000" dirty="0"/>
+              <a:t>Using our model,</a:t>
+            </a:r>
+            <a:br>
+              <a:rPr lang="en-IN" sz="2000" dirty="0"/>
+            </a:br>
+            <a:r>
+              <a:rPr lang="en-IN" sz="2000" b="1" dirty="0"/>
+              <a:t>Iowa Department of corrections can predict which prisoners may become recidivist.</a:t>
+            </a:r>
+          </a:p>
+          <a:p>
+            <a:r>
+              <a:rPr lang="en-IN" sz="2000" dirty="0"/>
+              <a:t>Using this information, Iowa can </a:t>
+            </a:r>
+            <a:r>
+              <a:rPr lang="en-IN" sz="2000" b="1" dirty="0"/>
+              <a:t>implement pre-release educational programs</a:t>
+            </a:r>
+            <a:r>
+              <a:rPr lang="en-IN" sz="2000" dirty="0"/>
+              <a:t> to target at-risk prisoners.</a:t>
+            </a:r>
+          </a:p>
+          <a:p>
+            <a:r>
+              <a:rPr lang="en-IN" sz="2000" dirty="0"/>
+              <a:t>Following release, Iowa could also </a:t>
+            </a:r>
+            <a:r>
+              <a:rPr lang="en-IN" sz="2000" b="1" dirty="0"/>
+              <a:t>provide  post-release support and intervention </a:t>
+            </a:r>
+            <a:r>
+              <a:rPr lang="en-IN" sz="2000" dirty="0"/>
+              <a:t>to at-risk prisoners. </a:t>
+            </a:r>
+            <a:endParaRPr lang="en-US" sz="2000" dirty="0"/>
+          </a:p>
+        </p:txBody>
+      </p:sp>
+      <p:sp>
+        <p:nvSpPr>
+          <p:cNvPr id="17" name="Freeform 6">
+            <a:extLst>
+              <a:ext uri="{FF2B5EF4-FFF2-40B4-BE49-F238E27FC236}">
+                <a16:creationId xmlns:a16="http://schemas.microsoft.com/office/drawing/2014/main" id="{A9616D99-AEFB-4C95-84EF-5DEC698D92A7}"/>
+              </a:ext>
+              <a:ext uri="{C183D7F6-B498-43B3-948B-1728B52AA6E4}">
+                <adec:decorative xmlns:adec="http://schemas.microsoft.com/office/drawing/2017/decorative" val="1"/>
+              </a:ext>
+            </a:extLst>
+          </p:cNvPr>
+          <p:cNvSpPr>
+            <a:spLocks noGrp="1" noRot="1" noChangeAspect="1" noMove="1" noResize="1" noEditPoints="1" noAdjustHandles="1" noChangeArrowheads="1" noChangeShapeType="1" noTextEdit="1"/>
+          </p:cNvSpPr>
+          <p:nvPr>
+            <p:extLst>
+              <p:ext uri="{386F3935-93C4-4BCD-93E2-E3B085C9AB24}">
+                <p16:designElem xmlns:p16="http://schemas.microsoft.com/office/powerpoint/2015/main" val="1"/>
+              </p:ext>
+            </p:extLst>
+          </p:nvPr>
+        </p:nvSpPr>
+        <p:spPr bwMode="auto">
+          <a:xfrm flipH="1" flipV="1">
+            <a:off x="752858" y="744469"/>
+            <a:ext cx="3275668" cy="4408488"/>
+          </a:xfrm>
+          <a:custGeom>
+            <a:avLst/>
+            <a:gdLst/>
+            <a:ahLst/>
+            <a:cxnLst/>
+            <a:rect l="l" t="t" r="r" b="b"/>
+            <a:pathLst>
+              <a:path w="10002" h="10000">
+                <a:moveTo>
+                  <a:pt x="8763" y="0"/>
+                </a:moveTo>
+                <a:lnTo>
+                  <a:pt x="10002" y="0"/>
+                </a:lnTo>
+                <a:lnTo>
+                  <a:pt x="10002" y="10000"/>
+                </a:lnTo>
+                <a:lnTo>
+                  <a:pt x="2" y="10000"/>
+                </a:lnTo>
+                <a:cubicBezTo>
+                  <a:pt x="-2" y="9698"/>
+                  <a:pt x="4" y="9427"/>
+                  <a:pt x="0" y="9125"/>
+                </a:cubicBezTo>
+                <a:lnTo>
+                  <a:pt x="8763" y="9128"/>
+                </a:lnTo>
+                <a:lnTo>
+                  <a:pt x="8763" y="0"/>
+                </a:lnTo>
+                <a:close/>
+              </a:path>
+            </a:pathLst>
+          </a:custGeom>
+          <a:solidFill>
+            <a:srgbClr val="4C4C4C"/>
+          </a:solidFill>
+          <a:ln w="0">
+            <a:noFill/>
+            <a:prstDash val="solid"/>
+            <a:round/>
+            <a:headEnd/>
+            <a:tailEnd/>
+          </a:ln>
+        </p:spPr>
+      </p:sp>
+      <p:sp>
+        <p:nvSpPr>
+          <p:cNvPr id="19" name="Freeform 6">
+            <a:extLst>
+              <a:ext uri="{FF2B5EF4-FFF2-40B4-BE49-F238E27FC236}">
+                <a16:creationId xmlns:a16="http://schemas.microsoft.com/office/drawing/2014/main" id="{D0F97023-F626-4FC5-8C2D-753B5C7F4606}"/>
+              </a:ext>
+              <a:ext uri="{C183D7F6-B498-43B3-948B-1728B52AA6E4}">
+                <adec:decorative xmlns:adec="http://schemas.microsoft.com/office/drawing/2017/decorative" val="1"/>
+              </a:ext>
+            </a:extLst>
+          </p:cNvPr>
+          <p:cNvSpPr>
+            <a:spLocks noGrp="1" noRot="1" noChangeAspect="1" noMove="1" noResize="1" noEditPoints="1" noAdjustHandles="1" noChangeArrowheads="1" noChangeShapeType="1" noTextEdit="1"/>
+          </p:cNvSpPr>
+          <p:nvPr>
+            <p:extLst>
+              <p:ext uri="{386F3935-93C4-4BCD-93E2-E3B085C9AB24}">
+                <p16:designElem xmlns:p16="http://schemas.microsoft.com/office/powerpoint/2015/main" val="1"/>
+              </p:ext>
+            </p:extLst>
+          </p:nvPr>
+        </p:nvSpPr>
+        <p:spPr bwMode="auto">
+          <a:xfrm>
+            <a:off x="8151962" y="1685652"/>
+            <a:ext cx="3275013" cy="4408488"/>
+          </a:xfrm>
+          <a:custGeom>
+            <a:avLst/>
+            <a:gdLst/>
+            <a:ahLst/>
+            <a:cxnLst/>
+            <a:rect l="l" t="t" r="r" b="b"/>
+            <a:pathLst>
+              <a:path w="10000" h="10000">
+                <a:moveTo>
+                  <a:pt x="8761" y="0"/>
+                </a:moveTo>
+                <a:lnTo>
+                  <a:pt x="10000" y="0"/>
+                </a:lnTo>
+                <a:lnTo>
+                  <a:pt x="10000" y="10000"/>
+                </a:lnTo>
+                <a:lnTo>
+                  <a:pt x="0" y="10000"/>
+                </a:lnTo>
+                <a:lnTo>
+                  <a:pt x="0" y="9126"/>
+                </a:lnTo>
+                <a:lnTo>
+                  <a:pt x="8761" y="9127"/>
+                </a:lnTo>
+                <a:lnTo>
+                  <a:pt x="8761" y="0"/>
+                </a:lnTo>
+                <a:close/>
+              </a:path>
+            </a:pathLst>
+          </a:custGeom>
+          <a:solidFill>
+            <a:srgbClr val="4C4C4C"/>
+          </a:solidFill>
+          <a:ln w="0">
+            <a:noFill/>
+            <a:prstDash val="solid"/>
+            <a:round/>
+            <a:headEnd/>
+            <a:tailEnd/>
+          </a:ln>
+        </p:spPr>
+      </p:sp>
+      <p:pic>
+        <p:nvPicPr>
+          <p:cNvPr id="7" name="Graphic 6" descr="Checkmark">
+            <a:extLst>
+              <a:ext uri="{FF2B5EF4-FFF2-40B4-BE49-F238E27FC236}">
+                <a16:creationId xmlns:a16="http://schemas.microsoft.com/office/drawing/2014/main" id="{9D33B5D0-5BA6-4C7F-BE71-744A5DFBAF69}"/>
+              </a:ext>
+            </a:extLst>
+          </p:cNvPr>
+          <p:cNvPicPr>
+            <a:picLocks noChangeAspect="1"/>
+          </p:cNvPicPr>
+          <p:nvPr/>
+        </p:nvPicPr>
+        <p:blipFill>
+          <a:blip r:embed="rId2">
+            <a:extLst>
+              <a:ext uri="{28A0092B-C50C-407E-A947-70E740481C1C}">
+                <a14:useLocalDpi xmlns:a14="http://schemas.microsoft.com/office/drawing/2010/main" val="0"/>
+              </a:ext>
+              <a:ext uri="{96DAC541-7B7A-43D3-8B79-37D633B846F1}">
+                <asvg:svgBlip xmlns:asvg="http://schemas.microsoft.com/office/drawing/2016/SVG/main" r:embed="rId3"/>
+              </a:ext>
+            </a:extLst>
+          </a:blip>
+          <a:stretch>
+            <a:fillRect/>
+          </a:stretch>
+        </p:blipFill>
+        <p:spPr>
+          <a:xfrm>
+            <a:off x="8325899" y="3191551"/>
+            <a:ext cx="2194559" cy="2194559"/>
+          </a:xfrm>
+          <a:prstGeom prst="rect">
+            <a:avLst/>
+          </a:prstGeom>
+        </p:spPr>
+      </p:pic>
+    </p:spTree>
+    <p:extLst>
+      <p:ext uri="{BB962C8B-B14F-4D97-AF65-F5344CB8AC3E}">
+        <p14:creationId xmlns:p14="http://schemas.microsoft.com/office/powerpoint/2010/main" val="3633795809"/>
+      </p:ext>
+    </p:extLst>
+  </p:cSld>
+  <p:clrMapOvr>
+    <a:masterClrMapping/>
+  </p:clrMapOvr>
+</p:sld>
+</file>
+
+<file path=ppt/slides/slide7.xml><?xml version="1.0" encoding="utf-8"?>
+<p:sld xmlns:a="http://schemas.openxmlformats.org/drawingml/2006/main" xmlns:r="http://schemas.openxmlformats.org/officeDocument/2006/relationships" xmlns:p="http://schemas.openxmlformats.org/presentationml/2006/main">
+  <p:cSld>
+    <p:bg>
+      <p:bgPr>
+        <a:solidFill>
+          <a:schemeClr val="bg1">
+            <a:tint val="95000"/>
+            <a:satMod val="170000"/>
+          </a:schemeClr>
+        </a:solidFill>
+        <a:effectLst/>
+      </p:bgPr>
+    </p:bg>
+    <p:spTree>
+      <p:nvGrpSpPr>
+        <p:cNvPr id="1" name=""/>
+        <p:cNvGrpSpPr/>
+        <p:nvPr/>
+      </p:nvGrpSpPr>
+      <p:grpSpPr>
+        <a:xfrm>
+          <a:off x="0" y="0"/>
+          <a:ext cx="0" cy="0"/>
+          <a:chOff x="0" y="0"/>
+          <a:chExt cx="0" cy="0"/>
+        </a:xfrm>
+      </p:grpSpPr>
+      <p:sp>
+        <p:nvSpPr>
+          <p:cNvPr id="2" name="Title 1">
+            <a:extLst>
+              <a:ext uri="{FF2B5EF4-FFF2-40B4-BE49-F238E27FC236}">
+                <a16:creationId xmlns:a16="http://schemas.microsoft.com/office/drawing/2014/main" id="{4A26AD3D-A272-4B13-BE34-EEF81C082C49}"/>
+              </a:ext>
+            </a:extLst>
+          </p:cNvPr>
+          <p:cNvSpPr>
+            <a:spLocks noGrp="1"/>
+          </p:cNvSpPr>
+          <p:nvPr>
+            <p:ph type="title"/>
+          </p:nvPr>
+        </p:nvSpPr>
+        <p:spPr>
+          <a:xfrm>
+            <a:off x="762001" y="803325"/>
+            <a:ext cx="5314536" cy="1325563"/>
+          </a:xfrm>
+        </p:spPr>
+        <p:txBody>
+          <a:bodyPr>
+            <a:normAutofit/>
+          </a:bodyPr>
+          <a:lstStyle/>
+          <a:p>
+            <a:r>
+              <a:rPr lang="en-IN" dirty="0"/>
+              <a:t>THANK YOU</a:t>
+            </a:r>
+            <a:endParaRPr lang="en-US" dirty="0"/>
+          </a:p>
+        </p:txBody>
+      </p:sp>
+      <p:sp>
+        <p:nvSpPr>
+          <p:cNvPr id="3" name="Content Placeholder 2">
+            <a:extLst>
+              <a:ext uri="{FF2B5EF4-FFF2-40B4-BE49-F238E27FC236}">
+                <a16:creationId xmlns:a16="http://schemas.microsoft.com/office/drawing/2014/main" id="{E7E228F6-B9EC-4ACD-B289-E7B7F2E4E32C}"/>
+              </a:ext>
+            </a:extLst>
+          </p:cNvPr>
+          <p:cNvSpPr>
+            <a:spLocks noGrp="1"/>
+          </p:cNvSpPr>
+          <p:nvPr>
+            <p:ph idx="1"/>
+          </p:nvPr>
+        </p:nvSpPr>
+        <p:spPr>
+          <a:xfrm>
+            <a:off x="104775" y="2279017"/>
+            <a:ext cx="6478005" cy="4474207"/>
+          </a:xfrm>
+        </p:spPr>
+        <p:txBody>
+          <a:bodyPr anchor="t">
+            <a:normAutofit/>
+          </a:bodyPr>
+          <a:lstStyle/>
+          <a:p>
+            <a:r>
+              <a:rPr lang="en-IN" sz="2400" dirty="0"/>
+              <a:t>Michael </a:t>
+            </a:r>
+            <a:r>
+              <a:rPr lang="en-IN" sz="2400" dirty="0" err="1"/>
+              <a:t>Moravetz</a:t>
+            </a:r>
+            <a:r>
+              <a:rPr lang="en-IN" sz="2400" dirty="0"/>
+              <a:t> – </a:t>
+            </a:r>
+            <a:r>
+              <a:rPr lang="en-US" sz="2400" dirty="0"/>
+              <a:t> Collaborator</a:t>
+            </a:r>
+          </a:p>
+          <a:p>
+            <a:r>
+              <a:rPr lang="en-US" sz="2400" u="sng" dirty="0"/>
+              <a:t>Flatiron School – Data Science Bootcamp </a:t>
+            </a:r>
+          </a:p>
+          <a:p>
+            <a:pPr lvl="1"/>
+            <a:r>
+              <a:rPr lang="en-US" sz="2000" dirty="0"/>
+              <a:t>Brandon Lewis – Instructor </a:t>
+            </a:r>
+          </a:p>
+          <a:p>
+            <a:pPr lvl="1"/>
+            <a:r>
+              <a:rPr lang="en-US" sz="2000" dirty="0"/>
+              <a:t>Jeff Herman – Advisor</a:t>
+            </a:r>
+          </a:p>
+          <a:p>
+            <a:r>
+              <a:rPr lang="en-IN" sz="2400" u="sng" dirty="0"/>
+              <a:t>Python Packages:</a:t>
+            </a:r>
+          </a:p>
+          <a:p>
+            <a:pPr lvl="1"/>
+            <a:r>
+              <a:rPr lang="en-IN" sz="2000" dirty="0"/>
+              <a:t>Cookie-Cutter Python Package </a:t>
+            </a:r>
+          </a:p>
+          <a:p>
+            <a:pPr lvl="2"/>
+            <a:r>
+              <a:rPr lang="en-IN" dirty="0"/>
+              <a:t>for Enabling </a:t>
+            </a:r>
+            <a:r>
+              <a:rPr lang="en-IN" dirty="0" err="1"/>
+              <a:t>BroadSteel_DataScience</a:t>
+            </a:r>
+            <a:r>
+              <a:rPr lang="en-IN" dirty="0"/>
+              <a:t> </a:t>
+            </a:r>
+          </a:p>
+          <a:p>
+            <a:pPr lvl="2"/>
+            <a:r>
+              <a:rPr lang="en-US" dirty="0">
+                <a:hlinkClick r:id="rId2"/>
+              </a:rPr>
+              <a:t>https://cookiecutter-pypackage.readthedocs.io/en/latest/</a:t>
+            </a:r>
+            <a:endParaRPr lang="en-US" dirty="0"/>
+          </a:p>
+          <a:p>
+            <a:pPr lvl="1"/>
+            <a:r>
+              <a:rPr lang="en-US" sz="2000" dirty="0" err="1"/>
+              <a:t>CatBoost</a:t>
+            </a:r>
+            <a:r>
+              <a:rPr lang="en-US" sz="2000" dirty="0"/>
+              <a:t> Machine Learning Package</a:t>
+            </a:r>
+          </a:p>
+          <a:p>
+            <a:pPr lvl="2"/>
+            <a:r>
+              <a:rPr lang="en-US" dirty="0"/>
+              <a:t>Superior Modeling with categorical data.</a:t>
+            </a:r>
+          </a:p>
+          <a:p>
+            <a:pPr lvl="1"/>
+            <a:endParaRPr lang="en-IN" dirty="0"/>
+          </a:p>
+        </p:txBody>
+      </p:sp>
+      <p:sp>
+        <p:nvSpPr>
+          <p:cNvPr id="10" name="Freeform: Shape 9">
+            <a:extLst>
+              <a:ext uri="{FF2B5EF4-FFF2-40B4-BE49-F238E27FC236}">
+                <a16:creationId xmlns:a16="http://schemas.microsoft.com/office/drawing/2014/main" id="{CF62D2A7-8207-488C-9F46-316BA81A16C8}"/>
+              </a:ext>
+              <a:ext uri="{C183D7F6-B498-43B3-948B-1728B52AA6E4}">
+                <adec:decorative xmlns:adec="http://schemas.microsoft.com/office/drawing/2017/decorative" val="1"/>
+              </a:ext>
+            </a:extLst>
+          </p:cNvPr>
+          <p:cNvSpPr>
+            <a:spLocks noGrp="1" noRot="1" noChangeAspect="1" noMove="1" noResize="1" noEditPoints="1" noAdjustHandles="1" noChangeArrowheads="1" noChangeShapeType="1" noTextEdit="1"/>
+          </p:cNvSpPr>
+          <p:nvPr>
+            <p:extLst>
+              <p:ext uri="{386F3935-93C4-4BCD-93E2-E3B085C9AB24}">
+                <p16:designElem xmlns:p16="http://schemas.microsoft.com/office/powerpoint/2015/main" val="1"/>
+              </p:ext>
+            </p:extLst>
+          </p:nvPr>
+        </p:nvSpPr>
+        <p:spPr>
+          <a:xfrm flipH="1">
+            <a:off x="6582780" y="-2008"/>
+            <a:ext cx="5609220" cy="5840278"/>
+          </a:xfrm>
+          <a:custGeom>
+            <a:avLst/>
+            <a:gdLst>
+              <a:gd name="connsiteX0" fmla="*/ 0 w 5609220"/>
+              <a:gd name="connsiteY0" fmla="*/ 0 h 5840278"/>
+              <a:gd name="connsiteX1" fmla="*/ 4637091 w 5609220"/>
+              <a:gd name="connsiteY1" fmla="*/ 0 h 5840278"/>
+              <a:gd name="connsiteX2" fmla="*/ 4822569 w 5609220"/>
+              <a:gd name="connsiteY2" fmla="*/ 204077 h 5840278"/>
+              <a:gd name="connsiteX3" fmla="*/ 5609220 w 5609220"/>
+              <a:gd name="connsiteY3" fmla="*/ 2395363 h 5840278"/>
+              <a:gd name="connsiteX4" fmla="*/ 2164305 w 5609220"/>
+              <a:gd name="connsiteY4" fmla="*/ 5840278 h 5840278"/>
+              <a:gd name="connsiteX5" fmla="*/ 238220 w 5609220"/>
+              <a:gd name="connsiteY5" fmla="*/ 5251941 h 5840278"/>
+              <a:gd name="connsiteX6" fmla="*/ 0 w 5609220"/>
+              <a:gd name="connsiteY6" fmla="*/ 5073803 h 5840278"/>
+            </a:gdLst>
+            <a:ahLst/>
+            <a:cxnLst>
+              <a:cxn ang="0">
+                <a:pos x="connsiteX0" y="connsiteY0"/>
+              </a:cxn>
+              <a:cxn ang="0">
+                <a:pos x="connsiteX1" y="connsiteY1"/>
+              </a:cxn>
+              <a:cxn ang="0">
+                <a:pos x="connsiteX2" y="connsiteY2"/>
+              </a:cxn>
+              <a:cxn ang="0">
+                <a:pos x="connsiteX3" y="connsiteY3"/>
+              </a:cxn>
+              <a:cxn ang="0">
+                <a:pos x="connsiteX4" y="connsiteY4"/>
+              </a:cxn>
+              <a:cxn ang="0">
+                <a:pos x="connsiteX5" y="connsiteY5"/>
+              </a:cxn>
+              <a:cxn ang="0">
+                <a:pos x="connsiteX6" y="connsiteY6"/>
+              </a:cxn>
+            </a:cxnLst>
+            <a:rect l="l" t="t" r="r" b="b"/>
+            <a:pathLst>
+              <a:path w="5609220" h="5840278">
+                <a:moveTo>
+                  <a:pt x="0" y="0"/>
+                </a:moveTo>
+                <a:lnTo>
+                  <a:pt x="4637091" y="0"/>
+                </a:lnTo>
+                <a:lnTo>
+                  <a:pt x="4822569" y="204077"/>
+                </a:lnTo>
+                <a:cubicBezTo>
+                  <a:pt x="5314007" y="799562"/>
+                  <a:pt x="5609220" y="1562987"/>
+                  <a:pt x="5609220" y="2395363"/>
+                </a:cubicBezTo>
+                <a:cubicBezTo>
+                  <a:pt x="5609220" y="4297937"/>
+                  <a:pt x="4066879" y="5840278"/>
+                  <a:pt x="2164305" y="5840278"/>
+                </a:cubicBezTo>
+                <a:cubicBezTo>
+                  <a:pt x="1450840" y="5840278"/>
+                  <a:pt x="788032" y="5623387"/>
+                  <a:pt x="238220" y="5251941"/>
+                </a:cubicBezTo>
+                <a:lnTo>
+                  <a:pt x="0" y="5073803"/>
+                </a:lnTo>
+                <a:close/>
+              </a:path>
+            </a:pathLst>
+          </a:custGeom>
+          <a:solidFill>
+            <a:srgbClr val="FFFFFF">
+              <a:alpha val="80000"/>
+            </a:srgbClr>
+          </a:solidFill>
+          <a:ln>
+            <a:noFill/>
+          </a:ln>
+        </p:spPr>
+        <p:style>
+          <a:lnRef idx="2">
+            <a:schemeClr val="accent1">
+              <a:shade val="50000"/>
+            </a:schemeClr>
+          </a:lnRef>
+          <a:fillRef idx="1">
+            <a:schemeClr val="accent1"/>
+          </a:fillRef>
+          <a:effectRef idx="0">
+            <a:schemeClr val="accent1"/>
+          </a:effectRef>
+          <a:fontRef idx="minor">
+            <a:schemeClr val="lt1"/>
+          </a:fontRef>
+        </p:style>
+        <p:txBody>
+          <a:bodyPr rtlCol="0" anchor="ctr"/>
+          <a:lstStyle/>
+          <a:p>
+            <a:pPr marL="0" marR="0" lvl="0" indent="0" algn="ctr" defTabSz="914400" rtl="0" eaLnBrk="1" fontAlgn="auto" latinLnBrk="0" hangingPunct="1">
+              <a:lnSpc>
+                <a:spcPct val="100000"/>
+              </a:lnSpc>
+              <a:spcBef>
+                <a:spcPts val="0"/>
+              </a:spcBef>
+              <a:spcAft>
+                <a:spcPts val="0"/>
+              </a:spcAft>
+              <a:buClrTx/>
+              <a:buSzTx/>
+              <a:buFontTx/>
+              <a:buNone/>
+              <a:tabLst/>
+              <a:defRPr/>
+            </a:pPr>
+            <a:endParaRPr kumimoji="0" lang="en-US" sz="1800" b="0" i="0" u="none" strike="noStrike" kern="1200" cap="none" spc="0" normalizeH="0" baseline="0" noProof="0">
+              <a:ln>
+                <a:noFill/>
+              </a:ln>
+              <a:solidFill>
+                <a:prstClr val="white"/>
+              </a:solidFill>
+              <a:effectLst/>
+              <a:uLnTx/>
+              <a:uFillTx/>
+              <a:latin typeface="Calibri" panose="020F0502020204030204"/>
+              <a:ea typeface="+mn-ea"/>
+              <a:cs typeface="+mn-cs"/>
+            </a:endParaRPr>
+          </a:p>
+        </p:txBody>
+      </p:sp>
+      <p:sp>
+        <p:nvSpPr>
+          <p:cNvPr id="12" name="Freeform: Shape 11">
+            <a:extLst>
+              <a:ext uri="{FF2B5EF4-FFF2-40B4-BE49-F238E27FC236}">
+                <a16:creationId xmlns:a16="http://schemas.microsoft.com/office/drawing/2014/main" id="{52AC6D7F-F068-4E11-BB06-F601D89BB980}"/>
+              </a:ext>
+              <a:ext uri="{C183D7F6-B498-43B3-948B-1728B52AA6E4}">
+                <adec:decorative xmlns:adec="http://schemas.microsoft.com/office/drawing/2017/decorative" val="1"/>
+              </a:ext>
+            </a:extLst>
+          </p:cNvPr>
+          <p:cNvSpPr>
+            <a:spLocks noGrp="1" noRot="1" noChangeAspect="1" noMove="1" noResize="1" noEditPoints="1" noAdjustHandles="1" noChangeArrowheads="1" noChangeShapeType="1" noTextEdit="1"/>
+          </p:cNvSpPr>
+          <p:nvPr>
+            <p:extLst>
+              <p:ext uri="{386F3935-93C4-4BCD-93E2-E3B085C9AB24}">
+                <p16:designElem xmlns:p16="http://schemas.microsoft.com/office/powerpoint/2015/main" val="1"/>
+              </p:ext>
+            </p:extLst>
+          </p:nvPr>
+        </p:nvSpPr>
+        <p:spPr>
+          <a:xfrm>
+            <a:off x="6750141" y="-2"/>
+            <a:ext cx="5441859" cy="5654940"/>
+          </a:xfrm>
+          <a:custGeom>
+            <a:avLst/>
+            <a:gdLst>
+              <a:gd name="connsiteX0" fmla="*/ 1041368 w 5441859"/>
+              <a:gd name="connsiteY0" fmla="*/ 0 h 5654940"/>
+              <a:gd name="connsiteX1" fmla="*/ 5441859 w 5441859"/>
+              <a:gd name="connsiteY1" fmla="*/ 0 h 5654940"/>
+              <a:gd name="connsiteX2" fmla="*/ 5441859 w 5441859"/>
+              <a:gd name="connsiteY2" fmla="*/ 4820612 h 5654940"/>
+              <a:gd name="connsiteX3" fmla="*/ 5285166 w 5441859"/>
+              <a:gd name="connsiteY3" fmla="*/ 4957981 h 5654940"/>
+              <a:gd name="connsiteX4" fmla="*/ 3267719 w 5441859"/>
+              <a:gd name="connsiteY4" fmla="*/ 5654940 h 5654940"/>
+              <a:gd name="connsiteX5" fmla="*/ 0 w 5441859"/>
+              <a:gd name="connsiteY5" fmla="*/ 2387221 h 5654940"/>
+              <a:gd name="connsiteX6" fmla="*/ 957093 w 5441859"/>
+              <a:gd name="connsiteY6" fmla="*/ 76595 h 5654940"/>
+            </a:gdLst>
+            <a:ahLst/>
+            <a:cxnLst>
+              <a:cxn ang="0">
+                <a:pos x="connsiteX0" y="connsiteY0"/>
+              </a:cxn>
+              <a:cxn ang="0">
+                <a:pos x="connsiteX1" y="connsiteY1"/>
+              </a:cxn>
+              <a:cxn ang="0">
+                <a:pos x="connsiteX2" y="connsiteY2"/>
+              </a:cxn>
+              <a:cxn ang="0">
+                <a:pos x="connsiteX3" y="connsiteY3"/>
+              </a:cxn>
+              <a:cxn ang="0">
+                <a:pos x="connsiteX4" y="connsiteY4"/>
+              </a:cxn>
+              <a:cxn ang="0">
+                <a:pos x="connsiteX5" y="connsiteY5"/>
+              </a:cxn>
+              <a:cxn ang="0">
+                <a:pos x="connsiteX6" y="connsiteY6"/>
+              </a:cxn>
+            </a:cxnLst>
+            <a:rect l="l" t="t" r="r" b="b"/>
+            <a:pathLst>
+              <a:path w="5441859" h="5654940">
+                <a:moveTo>
+                  <a:pt x="1041368" y="0"/>
+                </a:moveTo>
+                <a:lnTo>
+                  <a:pt x="5441859" y="0"/>
+                </a:lnTo>
+                <a:lnTo>
+                  <a:pt x="5441859" y="4820612"/>
+                </a:lnTo>
+                <a:lnTo>
+                  <a:pt x="5285166" y="4957981"/>
+                </a:lnTo>
+                <a:cubicBezTo>
+                  <a:pt x="4729628" y="5394557"/>
+                  <a:pt x="4029081" y="5654940"/>
+                  <a:pt x="3267719" y="5654940"/>
+                </a:cubicBezTo>
+                <a:cubicBezTo>
+                  <a:pt x="1463008" y="5654940"/>
+                  <a:pt x="0" y="4191932"/>
+                  <a:pt x="0" y="2387221"/>
+                </a:cubicBezTo>
+                <a:cubicBezTo>
+                  <a:pt x="0" y="1484866"/>
+                  <a:pt x="365752" y="667936"/>
+                  <a:pt x="957093" y="76595"/>
+                </a:cubicBezTo>
+                <a:close/>
+              </a:path>
+            </a:pathLst>
+          </a:custGeom>
+          <a:solidFill>
+            <a:schemeClr val="tx1"/>
+          </a:solidFill>
+          <a:ln>
+            <a:noFill/>
+          </a:ln>
+        </p:spPr>
+        <p:style>
+          <a:lnRef idx="2">
+            <a:schemeClr val="accent1">
+              <a:shade val="50000"/>
+            </a:schemeClr>
+          </a:lnRef>
+          <a:fillRef idx="1">
+            <a:schemeClr val="accent1"/>
+          </a:fillRef>
+          <a:effectRef idx="0">
+            <a:schemeClr val="accent1"/>
+          </a:effectRef>
+          <a:fontRef idx="minor">
+            <a:schemeClr val="lt1"/>
+          </a:fontRef>
+        </p:style>
+        <p:txBody>
+          <a:bodyPr rtlCol="0" anchor="ctr"/>
+          <a:lstStyle/>
+          <a:p>
+            <a:pPr marL="0" marR="0" lvl="0" indent="0" algn="ctr" defTabSz="914400" rtl="0" eaLnBrk="1" fontAlgn="auto" latinLnBrk="0" hangingPunct="1">
+              <a:lnSpc>
+                <a:spcPct val="100000"/>
+              </a:lnSpc>
+              <a:spcBef>
+                <a:spcPts val="0"/>
+              </a:spcBef>
+              <a:spcAft>
+                <a:spcPts val="0"/>
+              </a:spcAft>
+              <a:buClrTx/>
+              <a:buSzTx/>
+              <a:buFontTx/>
+              <a:buNone/>
+              <a:tabLst/>
+              <a:defRPr/>
+            </a:pPr>
+            <a:endParaRPr kumimoji="0" lang="en-US" sz="1800" b="0" i="0" u="none" strike="noStrike" kern="1200" cap="none" spc="0" normalizeH="0" baseline="0" noProof="0">
+              <a:ln>
+                <a:noFill/>
+              </a:ln>
+              <a:solidFill>
+                <a:prstClr val="white"/>
+              </a:solidFill>
+              <a:effectLst/>
+              <a:uLnTx/>
+              <a:uFillTx/>
+              <a:latin typeface="Calibri" panose="020F0502020204030204"/>
+              <a:ea typeface="+mn-ea"/>
+              <a:cs typeface="+mn-cs"/>
+            </a:endParaRPr>
+          </a:p>
+        </p:txBody>
+      </p:sp>
+      <p:pic>
+        <p:nvPicPr>
+          <p:cNvPr id="7" name="Graphic 6" descr="Star">
+            <a:extLst>
+              <a:ext uri="{FF2B5EF4-FFF2-40B4-BE49-F238E27FC236}">
+                <a16:creationId xmlns:a16="http://schemas.microsoft.com/office/drawing/2014/main" id="{78C8DEE5-A90A-49C8-B9DF-B8DC6137626A}"/>
+              </a:ext>
+            </a:extLst>
+          </p:cNvPr>
+          <p:cNvPicPr>
+            <a:picLocks noChangeAspect="1"/>
+          </p:cNvPicPr>
+          <p:nvPr/>
+        </p:nvPicPr>
+        <p:blipFill>
+          <a:blip r:embed="rId3">
+            <a:extLst>
+              <a:ext uri="{28A0092B-C50C-407E-A947-70E740481C1C}">
+                <a14:useLocalDpi xmlns:a14="http://schemas.microsoft.com/office/drawing/2010/main" val="0"/>
+              </a:ext>
+              <a:ext uri="{96DAC541-7B7A-43D3-8B79-37D633B846F1}">
+                <asvg:svgBlip xmlns:asvg="http://schemas.microsoft.com/office/drawing/2016/SVG/main" r:embed="rId4"/>
+              </a:ext>
+            </a:extLst>
+          </a:blip>
+          <a:stretch>
+            <a:fillRect/>
+          </a:stretch>
+        </p:blipFill>
+        <p:spPr>
+          <a:xfrm>
+            <a:off x="7884057" y="643002"/>
+            <a:ext cx="3796790" cy="3796790"/>
+          </a:xfrm>
+          <a:prstGeom prst="rect">
+            <a:avLst/>
+          </a:prstGeom>
+        </p:spPr>
+      </p:pic>
+    </p:spTree>
+    <p:extLst>
+      <p:ext uri="{BB962C8B-B14F-4D97-AF65-F5344CB8AC3E}">
+        <p14:creationId xmlns:p14="http://schemas.microsoft.com/office/powerpoint/2010/main" val="3850931023"/>
+      </p:ext>
+    </p:extLst>
+  </p:cSld>
+  <p:clrMapOvr>
+    <a:overrideClrMapping bg1="dk1" tx1="lt1" bg2="dk2" tx2="lt2" accent1="accent1" accent2="accent2" accent3="accent3" accent4="accent4" accent5="accent5" accent6="accent6" hlink="hlink" folHlink="folHlink"/>
   </p:clrMapOvr>
 </p:sld>
 </file>

</xml_diff>